<commit_message>
Update ui diagram and change list command message
</commit_message>
<xml_diff>
--- a/docs/diagrams/DG_diagrams.pptx
+++ b/docs/diagrams/DG_diagrams.pptx
@@ -215,7 +215,7 @@
           <a:p>
             <a:fld id="{F5CC4B3F-88C1-4FFA-B1B6-F41C21DC6924}" type="datetimeFigureOut">
               <a:rPr lang="en-US" smtClean="0"/>
-              <a:t>3/24/2017</a:t>
+              <a:t>4/9/17</a:t>
             </a:fld>
             <a:endParaRPr lang="en-US"/>
           </a:p>
@@ -664,7 +664,7 @@
           <a:p>
             <a:fld id="{78C97017-6FC3-485B-9764-EAC9E56C1D49}" type="datetimeFigureOut">
               <a:rPr lang="en-US" smtClean="0"/>
-              <a:t>3/24/2017</a:t>
+              <a:t>4/9/17</a:t>
             </a:fld>
             <a:endParaRPr lang="en-US"/>
           </a:p>
@@ -834,7 +834,7 @@
           <a:p>
             <a:fld id="{78C97017-6FC3-485B-9764-EAC9E56C1D49}" type="datetimeFigureOut">
               <a:rPr lang="en-US" smtClean="0"/>
-              <a:t>3/24/2017</a:t>
+              <a:t>4/9/17</a:t>
             </a:fld>
             <a:endParaRPr lang="en-US"/>
           </a:p>
@@ -1014,7 +1014,7 @@
           <a:p>
             <a:fld id="{78C97017-6FC3-485B-9764-EAC9E56C1D49}" type="datetimeFigureOut">
               <a:rPr lang="en-US" smtClean="0"/>
-              <a:t>3/24/2017</a:t>
+              <a:t>4/9/17</a:t>
             </a:fld>
             <a:endParaRPr lang="en-US"/>
           </a:p>
@@ -1184,7 +1184,7 @@
           <a:p>
             <a:fld id="{78C97017-6FC3-485B-9764-EAC9E56C1D49}" type="datetimeFigureOut">
               <a:rPr lang="en-US" smtClean="0"/>
-              <a:t>3/24/2017</a:t>
+              <a:t>4/9/17</a:t>
             </a:fld>
             <a:endParaRPr lang="en-US"/>
           </a:p>
@@ -1430,7 +1430,7 @@
           <a:p>
             <a:fld id="{78C97017-6FC3-485B-9764-EAC9E56C1D49}" type="datetimeFigureOut">
               <a:rPr lang="en-US" smtClean="0"/>
-              <a:t>3/24/2017</a:t>
+              <a:t>4/9/17</a:t>
             </a:fld>
             <a:endParaRPr lang="en-US"/>
           </a:p>
@@ -1718,7 +1718,7 @@
           <a:p>
             <a:fld id="{78C97017-6FC3-485B-9764-EAC9E56C1D49}" type="datetimeFigureOut">
               <a:rPr lang="en-US" smtClean="0"/>
-              <a:t>3/24/2017</a:t>
+              <a:t>4/9/17</a:t>
             </a:fld>
             <a:endParaRPr lang="en-US"/>
           </a:p>
@@ -2140,7 +2140,7 @@
           <a:p>
             <a:fld id="{78C97017-6FC3-485B-9764-EAC9E56C1D49}" type="datetimeFigureOut">
               <a:rPr lang="en-US" smtClean="0"/>
-              <a:t>3/24/2017</a:t>
+              <a:t>4/9/17</a:t>
             </a:fld>
             <a:endParaRPr lang="en-US"/>
           </a:p>
@@ -2258,7 +2258,7 @@
           <a:p>
             <a:fld id="{78C97017-6FC3-485B-9764-EAC9E56C1D49}" type="datetimeFigureOut">
               <a:rPr lang="en-US" smtClean="0"/>
-              <a:t>3/24/2017</a:t>
+              <a:t>4/9/17</a:t>
             </a:fld>
             <a:endParaRPr lang="en-US"/>
           </a:p>
@@ -2353,7 +2353,7 @@
           <a:p>
             <a:fld id="{78C97017-6FC3-485B-9764-EAC9E56C1D49}" type="datetimeFigureOut">
               <a:rPr lang="en-US" smtClean="0"/>
-              <a:t>3/24/2017</a:t>
+              <a:t>4/9/17</a:t>
             </a:fld>
             <a:endParaRPr lang="en-US"/>
           </a:p>
@@ -2630,7 +2630,7 @@
           <a:p>
             <a:fld id="{78C97017-6FC3-485B-9764-EAC9E56C1D49}" type="datetimeFigureOut">
               <a:rPr lang="en-US" smtClean="0"/>
-              <a:t>3/24/2017</a:t>
+              <a:t>4/9/17</a:t>
             </a:fld>
             <a:endParaRPr lang="en-US"/>
           </a:p>
@@ -2883,7 +2883,7 @@
           <a:p>
             <a:fld id="{78C97017-6FC3-485B-9764-EAC9E56C1D49}" type="datetimeFigureOut">
               <a:rPr lang="en-US" smtClean="0"/>
-              <a:t>3/24/2017</a:t>
+              <a:t>4/9/17</a:t>
             </a:fld>
             <a:endParaRPr lang="en-US"/>
           </a:p>
@@ -3096,7 +3096,7 @@
           <a:p>
             <a:fld id="{78C97017-6FC3-485B-9764-EAC9E56C1D49}" type="datetimeFigureOut">
               <a:rPr lang="en-US" smtClean="0"/>
-              <a:t>3/24/2017</a:t>
+              <a:t>4/9/17</a:t>
             </a:fld>
             <a:endParaRPr lang="en-US"/>
           </a:p>
@@ -27572,7 +27572,7 @@
         <p:spPr>
           <a:xfrm>
             <a:off x="3310380" y="4966000"/>
-            <a:ext cx="1093635" cy="236841"/>
+            <a:ext cx="1185420" cy="236841"/>
           </a:xfrm>
           <a:prstGeom prst="rect">
             <a:avLst/>
@@ -27698,14 +27698,14 @@
           <a:p>
             <a:pPr algn="ctr"/>
             <a:r>
-              <a:rPr lang="en-US" sz="1050" b="1" dirty="0">
+              <a:rPr lang="en-US" sz="1050" b="1" smtClean="0">
                 <a:solidFill>
                   <a:schemeClr val="accent3">
                     <a:lumMod val="75000"/>
                   </a:schemeClr>
                 </a:solidFill>
               </a:rPr>
-              <a:t>HelpWindow</a:t>
+              <a:t>WelcomeWindow</a:t>
             </a:r>
             <a:endParaRPr lang="en-SG" sz="1050" b="1" dirty="0">
               <a:solidFill>
@@ -28147,7 +28147,7 @@
         <p:spPr>
           <a:xfrm rot="16200000" flipH="1">
             <a:off x="1901971" y="3676012"/>
-            <a:ext cx="2396440" cy="420377"/>
+            <a:ext cx="2396440" cy="420378"/>
           </a:xfrm>
           <a:prstGeom prst="bentConnector2">
             <a:avLst/>
@@ -28523,8 +28523,8 @@
         </p:nvCxnSpPr>
         <p:spPr>
           <a:xfrm rot="5400000">
-            <a:off x="3926708" y="2763307"/>
-            <a:ext cx="2798421" cy="1843806"/>
+            <a:off x="3972601" y="2809200"/>
+            <a:ext cx="2798421" cy="1752021"/>
           </a:xfrm>
           <a:prstGeom prst="bentConnector2">
             <a:avLst/>
@@ -28897,7 +28897,7 @@
           <a:p>
             <a:pPr algn="ctr"/>
             <a:r>
-              <a:rPr lang="en-US" sz="1050" dirty="0" err="1">
+              <a:rPr lang="en-US" sz="1050" dirty="0">
                 <a:solidFill>
                   <a:schemeClr val="bg1"/>
                 </a:solidFill>
@@ -29264,7 +29264,7 @@
         </p:nvSpPr>
         <p:spPr>
           <a:xfrm>
-            <a:off x="6153748" y="2743200"/>
+            <a:off x="6153748" y="2805240"/>
             <a:ext cx="229325" cy="166560"/>
           </a:xfrm>
           <a:prstGeom prst="rect">
@@ -29587,7 +29587,7 @@
         </p:nvSpPr>
         <p:spPr>
           <a:xfrm>
-            <a:off x="6149425" y="4488138"/>
+            <a:off x="6149425" y="4411938"/>
             <a:ext cx="229325" cy="160062"/>
           </a:xfrm>
           <a:prstGeom prst="rect">
@@ -30077,7 +30077,7 @@
           <a:p>
             <a:pPr algn="ctr"/>
             <a:r>
-              <a:rPr lang="en-US" sz="1050" b="1" dirty="0" err="1" smtClean="0">
+              <a:rPr lang="en-US" sz="1050" b="1" dirty="0" smtClean="0">
                 <a:solidFill>
                   <a:schemeClr val="accent3">
                     <a:lumMod val="75000"/>

</xml_diff>